<commit_message>
typo zmin a zmax
</commit_message>
<xml_diff>
--- a/02_repaso/clase01_repaso_probabilidad/repaso_probabilidad.pptx
+++ b/02_repaso/clase01_repaso_probabilidad/repaso_probabilidad.pptx
@@ -8140,8 +8140,8 @@
           </p:sp>
         </mc:Fallback>
       </mc:AlternateContent>
-      <mc:AlternateContent xmlns:mc="http://schemas.openxmlformats.org/markup-compatibility/2006" xmlns:a14="http://schemas.microsoft.com/office/drawing/2010/main">
-        <mc:Choice Requires="a14">
+      <mc:AlternateContent xmlns:mc="http://schemas.openxmlformats.org/markup-compatibility/2006">
+        <mc:Choice xmlns:a14="http://schemas.microsoft.com/office/drawing/2010/main" Requires="a14">
           <p:sp>
             <p:nvSpPr>
               <p:cNvPr id="20" name="Google Shape;45;p9">
@@ -8498,7 +8498,17 @@
                           <a:effectLst/>
                           <a:latin typeface="Cambria Math" panose="02040503050406030204" pitchFamily="18" charset="0"/>
                         </a:rPr>
-                        <m:t>𝑍𝑚𝑖𝑛</m:t>
+                        <m:t>𝑍</m:t>
+                      </m:r>
+                      <m:r>
+                        <a:rPr lang="es-ES" sz="1300" b="0" i="1" smtClean="0">
+                          <a:solidFill>
+                            <a:srgbClr val="000000"/>
+                          </a:solidFill>
+                          <a:effectLst/>
+                          <a:latin typeface="Cambria Math" panose="02040503050406030204" pitchFamily="18" charset="0"/>
+                        </a:rPr>
+                        <m:t>𝑚𝑎𝑥</m:t>
                       </m:r>
                       <m:r>
                         <a:rPr lang="en-US" sz="1300" b="0" i="1" smtClean="0">
@@ -8585,7 +8595,7 @@
             </p:txBody>
           </p:sp>
         </mc:Choice>
-        <mc:Fallback xmlns="">
+        <mc:Fallback>
           <p:sp>
             <p:nvSpPr>
               <p:cNvPr id="20" name="Google Shape;45;p9">

</xml_diff>

<commit_message>
upd repaso probabilidad caratula
</commit_message>
<xml_diff>
--- a/02_repaso/clase01_repaso_probabilidad/repaso_probabilidad.pptx
+++ b/02_repaso/clase01_repaso_probabilidad/repaso_probabilidad.pptx
@@ -5792,7 +5792,7 @@
             </a:pPr>
             <a:r>
               <a:rPr lang="en" sz="2070" dirty="0"/>
-              <a:t>Curso: I4051</a:t>
+              <a:t>Curso: I4051 (Palazzo)</a:t>
             </a:r>
             <a:endParaRPr sz="2070" dirty="0"/>
           </a:p>
@@ -5812,51 +5812,13 @@
               <a:buNone/>
             </a:pPr>
             <a:r>
-              <a:rPr lang="en" sz="2070" dirty="0"/>
-              <a:t>Elaborado por: Rodrigo Maranzana</a:t>
+              <a:rPr lang="en" sz="2070"/>
+              <a:t>Docente: </a:t>
             </a:r>
-            <a:endParaRPr sz="2070" dirty="0"/>
-          </a:p>
-          <a:p>
-            <a:pPr marL="0" lvl="0" indent="0" algn="l" rtl="0">
-              <a:spcBef>
-                <a:spcPts val="0"/>
-              </a:spcBef>
-              <a:spcAft>
-                <a:spcPts val="0"/>
-              </a:spcAft>
-              <a:buClr>
-                <a:schemeClr val="dk2"/>
-              </a:buClr>
-              <a:buSzPts val="2070"/>
-              <a:buFont typeface="Arial"/>
-              <a:buNone/>
-            </a:pPr>
             <a:r>
               <a:rPr lang="en" sz="2070" dirty="0"/>
-              <a:t>Docente: Martín Palazzo</a:t>
+              <a:t>Rodrigo Maranzana</a:t>
             </a:r>
-            <a:endParaRPr dirty="0">
-              <a:latin typeface="Helvetica Neue"/>
-              <a:ea typeface="Helvetica Neue"/>
-              <a:cs typeface="Helvetica Neue"/>
-              <a:sym typeface="Helvetica Neue"/>
-            </a:endParaRPr>
-          </a:p>
-          <a:p>
-            <a:pPr marL="0" lvl="0" indent="0" algn="l" rtl="0">
-              <a:spcBef>
-                <a:spcPts val="0"/>
-              </a:spcBef>
-              <a:spcAft>
-                <a:spcPts val="0"/>
-              </a:spcAft>
-              <a:buClr>
-                <a:schemeClr val="dk2"/>
-              </a:buClr>
-              <a:buFont typeface="Arial"/>
-              <a:buNone/>
-            </a:pPr>
             <a:endParaRPr dirty="0">
               <a:latin typeface="Helvetica Neue"/>
               <a:ea typeface="Helvetica Neue"/>

</xml_diff>